<commit_message>
Update ANL201 Study Unit 5_2022 - Lecturer.pptx
</commit_message>
<xml_diff>
--- a/SuSS/2022_ANL201_Viz_Biz/3_Lecture/ANL201 Study Unit 5_2022 - Lecturer.pptx
+++ b/SuSS/2022_ANL201_Viz_Biz/3_Lecture/ANL201 Study Unit 5_2022 - Lecturer.pptx
@@ -250,7 +250,7 @@
           <a:p>
             <a:fld id="{FB7F86EF-755F-EF49-95CD-E6F9DEA0E285}" type="datetimeFigureOut">
               <a:rPr lang="en-US" smtClean="0"/>
-              <a:t>1/20/2022</a:t>
+              <a:t>3/3/2022</a:t>
             </a:fld>
             <a:endParaRPr lang="en-US"/>
           </a:p>
@@ -415,7 +415,7 @@
           <a:p>
             <a:fld id="{847550CD-65C1-0D40-9457-6DF5C95A232D}" type="datetimeFigureOut">
               <a:rPr lang="en-US" smtClean="0"/>
-              <a:t>1/20/2022</a:t>
+              <a:t>3/3/2022</a:t>
             </a:fld>
             <a:endParaRPr lang="en-US"/>
           </a:p>
@@ -20670,6 +20670,84 @@
   <p:clrMapOvr>
     <a:masterClrMapping/>
   </p:clrMapOvr>
+  <p:timing>
+    <p:tnLst>
+      <p:par>
+        <p:cTn id="1" dur="indefinite" restart="never" nodeType="tmRoot">
+          <p:childTnLst>
+            <p:seq concurrent="1" nextAc="seek">
+              <p:cTn id="2" dur="indefinite" nodeType="mainSeq">
+                <p:childTnLst>
+                  <p:par>
+                    <p:cTn id="3" fill="hold">
+                      <p:stCondLst>
+                        <p:cond delay="indefinite"/>
+                      </p:stCondLst>
+                      <p:childTnLst>
+                        <p:par>
+                          <p:cTn id="4" fill="hold">
+                            <p:stCondLst>
+                              <p:cond delay="0"/>
+                            </p:stCondLst>
+                            <p:childTnLst>
+                              <p:par>
+                                <p:cTn id="5" presetID="1" presetClass="entr" presetSubtype="0" fill="hold" grpId="0" nodeType="clickEffect">
+                                  <p:stCondLst>
+                                    <p:cond delay="0"/>
+                                  </p:stCondLst>
+                                  <p:childTnLst>
+                                    <p:set>
+                                      <p:cBhvr>
+                                        <p:cTn id="6" dur="1" fill="hold">
+                                          <p:stCondLst>
+                                            <p:cond delay="0"/>
+                                          </p:stCondLst>
+                                        </p:cTn>
+                                        <p:tgtEl>
+                                          <p:spTgt spid="6"/>
+                                        </p:tgtEl>
+                                        <p:attrNameLst>
+                                          <p:attrName>style.visibility</p:attrName>
+                                        </p:attrNameLst>
+                                      </p:cBhvr>
+                                      <p:to>
+                                        <p:strVal val="visible"/>
+                                      </p:to>
+                                    </p:set>
+                                  </p:childTnLst>
+                                </p:cTn>
+                              </p:par>
+                            </p:childTnLst>
+                          </p:cTn>
+                        </p:par>
+                      </p:childTnLst>
+                    </p:cTn>
+                  </p:par>
+                </p:childTnLst>
+              </p:cTn>
+              <p:prevCondLst>
+                <p:cond evt="onPrev" delay="0">
+                  <p:tgtEl>
+                    <p:sldTgt/>
+                  </p:tgtEl>
+                </p:cond>
+              </p:prevCondLst>
+              <p:nextCondLst>
+                <p:cond evt="onNext" delay="0">
+                  <p:tgtEl>
+                    <p:sldTgt/>
+                  </p:tgtEl>
+                </p:cond>
+              </p:nextCondLst>
+            </p:seq>
+          </p:childTnLst>
+        </p:cTn>
+      </p:par>
+    </p:tnLst>
+    <p:bldLst>
+      <p:bldP spid="6" grpId="0" animBg="1"/>
+    </p:bldLst>
+  </p:timing>
 </p:sld>
 </file>
 
@@ -21162,6 +21240,328 @@
   <p:clrMapOvr>
     <a:masterClrMapping/>
   </p:clrMapOvr>
+  <p:timing>
+    <p:tnLst>
+      <p:par>
+        <p:cTn id="1" dur="indefinite" restart="never" nodeType="tmRoot">
+          <p:childTnLst>
+            <p:seq concurrent="1" nextAc="seek">
+              <p:cTn id="2" dur="indefinite" nodeType="mainSeq">
+                <p:childTnLst>
+                  <p:par>
+                    <p:cTn id="3" fill="hold">
+                      <p:stCondLst>
+                        <p:cond delay="indefinite"/>
+                        <p:cond evt="onBegin" delay="0">
+                          <p:tn val="2"/>
+                        </p:cond>
+                      </p:stCondLst>
+                      <p:childTnLst>
+                        <p:par>
+                          <p:cTn id="4" fill="hold">
+                            <p:stCondLst>
+                              <p:cond delay="0"/>
+                            </p:stCondLst>
+                            <p:childTnLst>
+                              <p:par>
+                                <p:cTn id="5" presetID="1" presetClass="entr" presetSubtype="0" fill="hold" nodeType="withEffect">
+                                  <p:stCondLst>
+                                    <p:cond delay="0"/>
+                                  </p:stCondLst>
+                                  <p:childTnLst>
+                                    <p:set>
+                                      <p:cBhvr>
+                                        <p:cTn id="6" dur="1" fill="hold">
+                                          <p:stCondLst>
+                                            <p:cond delay="0"/>
+                                          </p:stCondLst>
+                                        </p:cTn>
+                                        <p:tgtEl>
+                                          <p:spTgt spid="6">
+                                            <p:txEl>
+                                              <p:pRg st="0" end="0"/>
+                                            </p:txEl>
+                                          </p:spTgt>
+                                        </p:tgtEl>
+                                        <p:attrNameLst>
+                                          <p:attrName>style.visibility</p:attrName>
+                                        </p:attrNameLst>
+                                      </p:cBhvr>
+                                      <p:to>
+                                        <p:strVal val="visible"/>
+                                      </p:to>
+                                    </p:set>
+                                  </p:childTnLst>
+                                </p:cTn>
+                              </p:par>
+                            </p:childTnLst>
+                          </p:cTn>
+                        </p:par>
+                      </p:childTnLst>
+                    </p:cTn>
+                  </p:par>
+                  <p:par>
+                    <p:cTn id="7" fill="hold">
+                      <p:stCondLst>
+                        <p:cond delay="indefinite"/>
+                      </p:stCondLst>
+                      <p:childTnLst>
+                        <p:par>
+                          <p:cTn id="8" fill="hold">
+                            <p:stCondLst>
+                              <p:cond delay="0"/>
+                            </p:stCondLst>
+                            <p:childTnLst>
+                              <p:par>
+                                <p:cTn id="9" presetID="1" presetClass="entr" presetSubtype="0" fill="hold" nodeType="clickEffect">
+                                  <p:stCondLst>
+                                    <p:cond delay="0"/>
+                                  </p:stCondLst>
+                                  <p:childTnLst>
+                                    <p:set>
+                                      <p:cBhvr>
+                                        <p:cTn id="10" dur="1" fill="hold">
+                                          <p:stCondLst>
+                                            <p:cond delay="0"/>
+                                          </p:stCondLst>
+                                        </p:cTn>
+                                        <p:tgtEl>
+                                          <p:spTgt spid="6">
+                                            <p:txEl>
+                                              <p:pRg st="1" end="1"/>
+                                            </p:txEl>
+                                          </p:spTgt>
+                                        </p:tgtEl>
+                                        <p:attrNameLst>
+                                          <p:attrName>style.visibility</p:attrName>
+                                        </p:attrNameLst>
+                                      </p:cBhvr>
+                                      <p:to>
+                                        <p:strVal val="visible"/>
+                                      </p:to>
+                                    </p:set>
+                                  </p:childTnLst>
+                                </p:cTn>
+                              </p:par>
+                            </p:childTnLst>
+                          </p:cTn>
+                        </p:par>
+                      </p:childTnLst>
+                    </p:cTn>
+                  </p:par>
+                  <p:par>
+                    <p:cTn id="11" fill="hold">
+                      <p:stCondLst>
+                        <p:cond delay="indefinite"/>
+                      </p:stCondLst>
+                      <p:childTnLst>
+                        <p:par>
+                          <p:cTn id="12" fill="hold">
+                            <p:stCondLst>
+                              <p:cond delay="0"/>
+                            </p:stCondLst>
+                            <p:childTnLst>
+                              <p:par>
+                                <p:cTn id="13" presetID="1" presetClass="entr" presetSubtype="0" fill="hold" nodeType="clickEffect">
+                                  <p:stCondLst>
+                                    <p:cond delay="0"/>
+                                  </p:stCondLst>
+                                  <p:childTnLst>
+                                    <p:set>
+                                      <p:cBhvr>
+                                        <p:cTn id="14" dur="1" fill="hold">
+                                          <p:stCondLst>
+                                            <p:cond delay="0"/>
+                                          </p:stCondLst>
+                                        </p:cTn>
+                                        <p:tgtEl>
+                                          <p:spTgt spid="6">
+                                            <p:txEl>
+                                              <p:pRg st="2" end="2"/>
+                                            </p:txEl>
+                                          </p:spTgt>
+                                        </p:tgtEl>
+                                        <p:attrNameLst>
+                                          <p:attrName>style.visibility</p:attrName>
+                                        </p:attrNameLst>
+                                      </p:cBhvr>
+                                      <p:to>
+                                        <p:strVal val="visible"/>
+                                      </p:to>
+                                    </p:set>
+                                  </p:childTnLst>
+                                </p:cTn>
+                              </p:par>
+                            </p:childTnLst>
+                          </p:cTn>
+                        </p:par>
+                      </p:childTnLst>
+                    </p:cTn>
+                  </p:par>
+                  <p:par>
+                    <p:cTn id="15" fill="hold">
+                      <p:stCondLst>
+                        <p:cond delay="indefinite"/>
+                      </p:stCondLst>
+                      <p:childTnLst>
+                        <p:par>
+                          <p:cTn id="16" fill="hold">
+                            <p:stCondLst>
+                              <p:cond delay="0"/>
+                            </p:stCondLst>
+                            <p:childTnLst>
+                              <p:par>
+                                <p:cTn id="17" presetID="1" presetClass="entr" presetSubtype="0" fill="hold" nodeType="clickEffect">
+                                  <p:stCondLst>
+                                    <p:cond delay="0"/>
+                                  </p:stCondLst>
+                                  <p:childTnLst>
+                                    <p:set>
+                                      <p:cBhvr>
+                                        <p:cTn id="18" dur="1" fill="hold">
+                                          <p:stCondLst>
+                                            <p:cond delay="0"/>
+                                          </p:stCondLst>
+                                        </p:cTn>
+                                        <p:tgtEl>
+                                          <p:spTgt spid="6">
+                                            <p:txEl>
+                                              <p:pRg st="4" end="4"/>
+                                            </p:txEl>
+                                          </p:spTgt>
+                                        </p:tgtEl>
+                                        <p:attrNameLst>
+                                          <p:attrName>style.visibility</p:attrName>
+                                        </p:attrNameLst>
+                                      </p:cBhvr>
+                                      <p:to>
+                                        <p:strVal val="visible"/>
+                                      </p:to>
+                                    </p:set>
+                                  </p:childTnLst>
+                                </p:cTn>
+                              </p:par>
+                              <p:par>
+                                <p:cTn id="19" presetID="1" presetClass="entr" presetSubtype="0" fill="hold" nodeType="withEffect">
+                                  <p:stCondLst>
+                                    <p:cond delay="0"/>
+                                  </p:stCondLst>
+                                  <p:childTnLst>
+                                    <p:set>
+                                      <p:cBhvr>
+                                        <p:cTn id="20" dur="1" fill="hold">
+                                          <p:stCondLst>
+                                            <p:cond delay="0"/>
+                                          </p:stCondLst>
+                                        </p:cTn>
+                                        <p:tgtEl>
+                                          <p:spTgt spid="6">
+                                            <p:txEl>
+                                              <p:pRg st="5" end="5"/>
+                                            </p:txEl>
+                                          </p:spTgt>
+                                        </p:tgtEl>
+                                        <p:attrNameLst>
+                                          <p:attrName>style.visibility</p:attrName>
+                                        </p:attrNameLst>
+                                      </p:cBhvr>
+                                      <p:to>
+                                        <p:strVal val="visible"/>
+                                      </p:to>
+                                    </p:set>
+                                  </p:childTnLst>
+                                </p:cTn>
+                              </p:par>
+                              <p:par>
+                                <p:cTn id="21" presetID="1" presetClass="entr" presetSubtype="0" fill="hold" nodeType="withEffect">
+                                  <p:stCondLst>
+                                    <p:cond delay="0"/>
+                                  </p:stCondLst>
+                                  <p:childTnLst>
+                                    <p:set>
+                                      <p:cBhvr>
+                                        <p:cTn id="22" dur="1" fill="hold">
+                                          <p:stCondLst>
+                                            <p:cond delay="0"/>
+                                          </p:stCondLst>
+                                        </p:cTn>
+                                        <p:tgtEl>
+                                          <p:spTgt spid="6">
+                                            <p:txEl>
+                                              <p:pRg st="6" end="6"/>
+                                            </p:txEl>
+                                          </p:spTgt>
+                                        </p:tgtEl>
+                                        <p:attrNameLst>
+                                          <p:attrName>style.visibility</p:attrName>
+                                        </p:attrNameLst>
+                                      </p:cBhvr>
+                                      <p:to>
+                                        <p:strVal val="visible"/>
+                                      </p:to>
+                                    </p:set>
+                                  </p:childTnLst>
+                                </p:cTn>
+                              </p:par>
+                              <p:par>
+                                <p:cTn id="23" presetID="1" presetClass="entr" presetSubtype="0" fill="hold" nodeType="withEffect">
+                                  <p:stCondLst>
+                                    <p:cond delay="0"/>
+                                  </p:stCondLst>
+                                  <p:childTnLst>
+                                    <p:set>
+                                      <p:cBhvr>
+                                        <p:cTn id="24" dur="1" fill="hold">
+                                          <p:stCondLst>
+                                            <p:cond delay="0"/>
+                                          </p:stCondLst>
+                                        </p:cTn>
+                                        <p:tgtEl>
+                                          <p:spTgt spid="6">
+                                            <p:txEl>
+                                              <p:pRg st="7" end="7"/>
+                                            </p:txEl>
+                                          </p:spTgt>
+                                        </p:tgtEl>
+                                        <p:attrNameLst>
+                                          <p:attrName>style.visibility</p:attrName>
+                                        </p:attrNameLst>
+                                      </p:cBhvr>
+                                      <p:to>
+                                        <p:strVal val="visible"/>
+                                      </p:to>
+                                    </p:set>
+                                  </p:childTnLst>
+                                </p:cTn>
+                              </p:par>
+                            </p:childTnLst>
+                          </p:cTn>
+                        </p:par>
+                      </p:childTnLst>
+                    </p:cTn>
+                  </p:par>
+                </p:childTnLst>
+              </p:cTn>
+              <p:prevCondLst>
+                <p:cond evt="onPrev" delay="0">
+                  <p:tgtEl>
+                    <p:sldTgt/>
+                  </p:tgtEl>
+                </p:cond>
+              </p:prevCondLst>
+              <p:nextCondLst>
+                <p:cond evt="onNext" delay="0">
+                  <p:tgtEl>
+                    <p:sldTgt/>
+                  </p:tgtEl>
+                </p:cond>
+              </p:nextCondLst>
+            </p:seq>
+          </p:childTnLst>
+        </p:cTn>
+      </p:par>
+    </p:tnLst>
+  </p:timing>
 </p:sld>
 </file>
 
@@ -21614,14 +22014,57 @@
       </p:pic>
       <p:sp>
         <p:nvSpPr>
-          <p:cNvPr id="7" name="Rounded Rectangle 6"/>
+          <p:cNvPr id="11" name="Title 1">
+            <a:extLst>
+              <a:ext uri="{FF2B5EF4-FFF2-40B4-BE49-F238E27FC236}">
+                <a16:creationId xmlns:a16="http://schemas.microsoft.com/office/drawing/2014/main" id="{DB03EA86-70B2-41AA-A3A3-6D9EB0248FF9}"/>
+              </a:ext>
+            </a:extLst>
+          </p:cNvPr>
+          <p:cNvSpPr>
+            <a:spLocks noGrp="1"/>
+          </p:cNvSpPr>
+          <p:nvPr>
+            <p:ph type="title"/>
+          </p:nvPr>
+        </p:nvSpPr>
+        <p:spPr>
+          <a:xfrm>
+            <a:off x="864683" y="-21052"/>
+            <a:ext cx="8563649" cy="823392"/>
+          </a:xfrm>
+        </p:spPr>
+        <p:txBody>
+          <a:bodyPr/>
+          <a:lstStyle/>
+          <a:p>
+            <a:r>
+              <a:rPr lang="en-US" sz="3200" dirty="0">
+                <a:latin typeface="Roboto Medium"/>
+                <a:ea typeface="Microsoft Himalaya" panose="01010100010101010101" pitchFamily="2" charset="0"/>
+                <a:cs typeface="Microsoft Himalaya" panose="01010100010101010101" pitchFamily="2" charset="0"/>
+              </a:rPr>
+              <a:t>Discussion</a:t>
+            </a:r>
+          </a:p>
+        </p:txBody>
+      </p:sp>
+      <p:sp>
+        <p:nvSpPr>
+          <p:cNvPr id="10" name="Rounded Rectangle 6">
+            <a:extLst>
+              <a:ext uri="{FF2B5EF4-FFF2-40B4-BE49-F238E27FC236}">
+                <a16:creationId xmlns:a16="http://schemas.microsoft.com/office/drawing/2014/main" id="{11FD0AC8-487B-4078-9DE2-6375A4BD5FA5}"/>
+              </a:ext>
+            </a:extLst>
+          </p:cNvPr>
           <p:cNvSpPr/>
           <p:nvPr/>
         </p:nvSpPr>
         <p:spPr>
           <a:xfrm>
-            <a:off x="1856233" y="1219491"/>
-            <a:ext cx="5058918" cy="978935"/>
+            <a:off x="1856233" y="1219492"/>
+            <a:ext cx="5058918" cy="896858"/>
           </a:xfrm>
           <a:prstGeom prst="roundRect">
             <a:avLst>
@@ -21680,13 +22123,19 @@
       </p:sp>
       <p:sp>
         <p:nvSpPr>
-          <p:cNvPr id="8" name="Rounded Rectangle 7"/>
+          <p:cNvPr id="12" name="Rounded Rectangle 7">
+            <a:extLst>
+              <a:ext uri="{FF2B5EF4-FFF2-40B4-BE49-F238E27FC236}">
+                <a16:creationId xmlns:a16="http://schemas.microsoft.com/office/drawing/2014/main" id="{9C775C8F-51D7-4363-B722-4A0ABB2B6B31}"/>
+              </a:ext>
+            </a:extLst>
+          </p:cNvPr>
           <p:cNvSpPr/>
           <p:nvPr/>
         </p:nvSpPr>
         <p:spPr>
           <a:xfrm>
-            <a:off x="1872561" y="2274917"/>
+            <a:off x="1872561" y="2376983"/>
             <a:ext cx="5058918" cy="837908"/>
           </a:xfrm>
           <a:prstGeom prst="roundRect">
@@ -21730,13 +22179,19 @@
       </p:sp>
       <p:sp>
         <p:nvSpPr>
-          <p:cNvPr id="9" name="Rounded Rectangle 8"/>
+          <p:cNvPr id="13" name="Rounded Rectangle 8">
+            <a:extLst>
+              <a:ext uri="{FF2B5EF4-FFF2-40B4-BE49-F238E27FC236}">
+                <a16:creationId xmlns:a16="http://schemas.microsoft.com/office/drawing/2014/main" id="{7644F6D3-0B28-43D7-81F4-A39C57BB8E60}"/>
+              </a:ext>
+            </a:extLst>
+          </p:cNvPr>
           <p:cNvSpPr/>
           <p:nvPr/>
         </p:nvSpPr>
         <p:spPr>
           <a:xfrm>
-            <a:off x="1856233" y="3224817"/>
+            <a:off x="1872561" y="3618703"/>
             <a:ext cx="5058918" cy="967985"/>
           </a:xfrm>
           <a:prstGeom prst="roundRect">
@@ -21785,43 +22240,6 @@
                 <a:schemeClr val="tx1"/>
               </a:solidFill>
             </a:endParaRPr>
-          </a:p>
-        </p:txBody>
-      </p:sp>
-      <p:sp>
-        <p:nvSpPr>
-          <p:cNvPr id="11" name="Title 1">
-            <a:extLst>
-              <a:ext uri="{FF2B5EF4-FFF2-40B4-BE49-F238E27FC236}">
-                <a16:creationId xmlns:a16="http://schemas.microsoft.com/office/drawing/2014/main" id="{DB03EA86-70B2-41AA-A3A3-6D9EB0248FF9}"/>
-              </a:ext>
-            </a:extLst>
-          </p:cNvPr>
-          <p:cNvSpPr>
-            <a:spLocks noGrp="1"/>
-          </p:cNvSpPr>
-          <p:nvPr>
-            <p:ph type="title"/>
-          </p:nvPr>
-        </p:nvSpPr>
-        <p:spPr>
-          <a:xfrm>
-            <a:off x="864683" y="-21052"/>
-            <a:ext cx="8563649" cy="823392"/>
-          </a:xfrm>
-        </p:spPr>
-        <p:txBody>
-          <a:bodyPr/>
-          <a:lstStyle/>
-          <a:p>
-            <a:r>
-              <a:rPr lang="en-US" sz="3200" dirty="0">
-                <a:latin typeface="Roboto Medium"/>
-                <a:ea typeface="Microsoft Himalaya" panose="01010100010101010101" pitchFamily="2" charset="0"/>
-                <a:cs typeface="Microsoft Himalaya" panose="01010100010101010101" pitchFamily="2" charset="0"/>
-              </a:rPr>
-              <a:t>Discussion</a:t>
-            </a:r>
           </a:p>
         </p:txBody>
       </p:sp>
@@ -27468,6 +27886,128 @@
               <a:latin typeface="Roboto Light" panose="02000000000000000000" pitchFamily="2" charset="0"/>
               <a:ea typeface="Roboto Light" panose="02000000000000000000" pitchFamily="2" charset="0"/>
             </a:endParaRPr>
+          </a:p>
+        </p:txBody>
+      </p:sp>
+      <p:sp>
+        <p:nvSpPr>
+          <p:cNvPr id="5" name="TextBox 4">
+            <a:extLst>
+              <a:ext uri="{FF2B5EF4-FFF2-40B4-BE49-F238E27FC236}">
+                <a16:creationId xmlns:a16="http://schemas.microsoft.com/office/drawing/2014/main" id="{1331BC4B-0876-4F7B-A3A8-45DD4562E926}"/>
+              </a:ext>
+            </a:extLst>
+          </p:cNvPr>
+          <p:cNvSpPr txBox="1"/>
+          <p:nvPr/>
+        </p:nvSpPr>
+        <p:spPr>
+          <a:xfrm>
+            <a:off x="7110630" y="897942"/>
+            <a:ext cx="1773157" cy="758394"/>
+          </a:xfrm>
+          <a:prstGeom prst="rect">
+            <a:avLst/>
+          </a:prstGeom>
+          <a:solidFill>
+            <a:schemeClr val="bg1"/>
+          </a:solidFill>
+        </p:spPr>
+        <p:style>
+          <a:lnRef idx="1">
+            <a:schemeClr val="accent1"/>
+          </a:lnRef>
+          <a:fillRef idx="3">
+            <a:schemeClr val="accent1"/>
+          </a:fillRef>
+          <a:effectRef idx="2">
+            <a:schemeClr val="accent1"/>
+          </a:effectRef>
+          <a:fontRef idx="minor">
+            <a:schemeClr val="lt1"/>
+          </a:fontRef>
+        </p:style>
+        <p:txBody>
+          <a:bodyPr rot="0" spcFirstLastPara="0" vertOverflow="overflow" horzOverflow="overflow" vert="horz" wrap="square" lIns="91440" tIns="45720" rIns="91440" bIns="45720" numCol="1" spcCol="0" rtlCol="0" fromWordArt="0" anchor="ctr" anchorCtr="0" forceAA="0" compatLnSpc="1">
+            <a:prstTxWarp prst="textNoShape">
+              <a:avLst/>
+            </a:prstTxWarp>
+            <a:noAutofit/>
+          </a:bodyPr>
+          <a:lstStyle>
+            <a:defPPr>
+              <a:defRPr lang="en-US"/>
+            </a:defPPr>
+            <a:lvl1pPr algn="just">
+              <a:defRPr sz="1200">
+                <a:solidFill>
+                  <a:srgbClr val="6600FF"/>
+                </a:solidFill>
+              </a:defRPr>
+            </a:lvl1pPr>
+            <a:lvl2pPr>
+              <a:defRPr>
+                <a:solidFill>
+                  <a:schemeClr val="lt1"/>
+                </a:solidFill>
+              </a:defRPr>
+            </a:lvl2pPr>
+            <a:lvl3pPr>
+              <a:defRPr>
+                <a:solidFill>
+                  <a:schemeClr val="lt1"/>
+                </a:solidFill>
+              </a:defRPr>
+            </a:lvl3pPr>
+            <a:lvl4pPr>
+              <a:defRPr>
+                <a:solidFill>
+                  <a:schemeClr val="lt1"/>
+                </a:solidFill>
+              </a:defRPr>
+            </a:lvl4pPr>
+            <a:lvl5pPr>
+              <a:defRPr>
+                <a:solidFill>
+                  <a:schemeClr val="lt1"/>
+                </a:solidFill>
+              </a:defRPr>
+            </a:lvl5pPr>
+            <a:lvl6pPr>
+              <a:defRPr>
+                <a:solidFill>
+                  <a:schemeClr val="lt1"/>
+                </a:solidFill>
+              </a:defRPr>
+            </a:lvl6pPr>
+            <a:lvl7pPr>
+              <a:defRPr>
+                <a:solidFill>
+                  <a:schemeClr val="lt1"/>
+                </a:solidFill>
+              </a:defRPr>
+            </a:lvl7pPr>
+            <a:lvl8pPr>
+              <a:defRPr>
+                <a:solidFill>
+                  <a:schemeClr val="lt1"/>
+                </a:solidFill>
+              </a:defRPr>
+            </a:lvl8pPr>
+            <a:lvl9pPr>
+              <a:defRPr>
+                <a:solidFill>
+                  <a:schemeClr val="lt1"/>
+                </a:solidFill>
+              </a:defRPr>
+            </a:lvl9pPr>
+          </a:lstStyle>
+          <a:p>
+            <a:r>
+              <a:rPr lang="en-US" dirty="0"/>
+              <a:t>Recall: We last discussed categorical and time-series data</a:t>
+            </a:r>
+            <a:endParaRPr lang="en-SG" dirty="0"/>
           </a:p>
         </p:txBody>
       </p:sp>
@@ -30025,6 +30565,24 @@
 </file>
 
 <file path=customXml/item1.xml><?xml version="1.0" encoding="utf-8"?>
+<p:properties xmlns:p="http://schemas.microsoft.com/office/2006/metadata/properties" xmlns:xsi="http://www.w3.org/2001/XMLSchema-instance" xmlns:pc="http://schemas.microsoft.com/office/infopath/2007/PartnerControls">
+  <documentManagement>
+    <_Version xmlns="http://schemas.microsoft.com/sharepoint/v3/fields" xsi:nil="true"/>
+    <_Status xmlns="http://schemas.microsoft.com/sharepoint/v3/fields">Not Started</_Status>
+  </documentManagement>
+</p:properties>
+</file>
+
+<file path=customXml/item2.xml><?xml version="1.0" encoding="utf-8"?>
+<?mso-contentType ?>
+<FormTemplates xmlns="http://schemas.microsoft.com/sharepoint/v3/contenttype/forms">
+  <Display>DocumentLibraryForm</Display>
+  <Edit>DocumentLibraryForm</Edit>
+  <New>DocumentLibraryForm</New>
+</FormTemplates>
+</file>
+
+<file path=customXml/item3.xml><?xml version="1.0" encoding="utf-8"?>
 <ct:contentTypeSchema xmlns:ct="http://schemas.microsoft.com/office/2006/metadata/contentType" xmlns:ma="http://schemas.microsoft.com/office/2006/metadata/properties/metaAttributes" ct:_="" ma:_="" ma:contentTypeName="Document" ma:contentTypeID="0x0101000DE64AEEDD9B7A4D93545ACBE97D4615" ma:contentTypeVersion="2" ma:contentTypeDescription="Create a new document." ma:contentTypeScope="" ma:versionID="f49002b78e3a4a71b814eef46a983816">
   <xsd:schema xmlns:xsd="http://www.w3.org/2001/XMLSchema" xmlns:xs="http://www.w3.org/2001/XMLSchema" xmlns:p="http://schemas.microsoft.com/office/2006/metadata/properties" xmlns:ns2="http://schemas.microsoft.com/sharepoint/v3/fields" targetNamespace="http://schemas.microsoft.com/office/2006/metadata/properties" ma:root="true" ma:fieldsID="38f6db2dd0d9a0cf6a8dc37be32b365b" ns2:_="">
     <xsd:import namespace="http://schemas.microsoft.com/sharepoint/v3/fields"/>
@@ -30168,25 +30726,25 @@
 </ct:contentTypeSchema>
 </file>
 
-<file path=customXml/item2.xml><?xml version="1.0" encoding="utf-8"?>
-<?mso-contentType ?>
-<FormTemplates xmlns="http://schemas.microsoft.com/sharepoint/v3/contenttype/forms">
-  <Display>DocumentLibraryForm</Display>
-  <Edit>DocumentLibraryForm</Edit>
-  <New>DocumentLibraryForm</New>
-</FormTemplates>
+<file path=customXml/itemProps1.xml><?xml version="1.0" encoding="utf-8"?>
+<ds:datastoreItem xmlns:ds="http://schemas.openxmlformats.org/officeDocument/2006/customXml" ds:itemID="{7B6F2769-7194-4217-93D3-3AF3A4742282}">
+  <ds:schemaRefs>
+    <ds:schemaRef ds:uri="http://schemas.microsoft.com/office/2006/metadata/properties"/>
+    <ds:schemaRef ds:uri="http://schemas.microsoft.com/office/infopath/2007/PartnerControls"/>
+    <ds:schemaRef ds:uri="http://schemas.microsoft.com/sharepoint/v3/fields"/>
+  </ds:schemaRefs>
+</ds:datastoreItem>
 </file>
 
-<file path=customXml/item3.xml><?xml version="1.0" encoding="utf-8"?>
-<p:properties xmlns:p="http://schemas.microsoft.com/office/2006/metadata/properties" xmlns:xsi="http://www.w3.org/2001/XMLSchema-instance" xmlns:pc="http://schemas.microsoft.com/office/infopath/2007/PartnerControls">
-  <documentManagement>
-    <_Version xmlns="http://schemas.microsoft.com/sharepoint/v3/fields" xsi:nil="true"/>
-    <_Status xmlns="http://schemas.microsoft.com/sharepoint/v3/fields">Not Started</_Status>
-  </documentManagement>
-</p:properties>
+<file path=customXml/itemProps2.xml><?xml version="1.0" encoding="utf-8"?>
+<ds:datastoreItem xmlns:ds="http://schemas.openxmlformats.org/officeDocument/2006/customXml" ds:itemID="{87D2A1B0-FF3E-4009-940D-AED0EB70AA20}">
+  <ds:schemaRefs>
+    <ds:schemaRef ds:uri="http://schemas.microsoft.com/sharepoint/v3/contenttype/forms"/>
+  </ds:schemaRefs>
+</ds:datastoreItem>
 </file>
 
-<file path=customXml/itemProps1.xml><?xml version="1.0" encoding="utf-8"?>
+<file path=customXml/itemProps3.xml><?xml version="1.0" encoding="utf-8"?>
 <ds:datastoreItem xmlns:ds="http://schemas.openxmlformats.org/officeDocument/2006/customXml" ds:itemID="{E4214858-785C-42F7-BE66-6D0E79395FC8}">
   <ds:schemaRefs>
     <ds:schemaRef ds:uri="http://schemas.microsoft.com/office/2006/metadata/contentType"/>
@@ -30202,22 +30760,4 @@
     <ds:schemaRef ds:uri="http://schemas.microsoft.com/internal/obd"/>
   </ds:schemaRefs>
 </ds:datastoreItem>
-</file>
-
-<file path=customXml/itemProps2.xml><?xml version="1.0" encoding="utf-8"?>
-<ds:datastoreItem xmlns:ds="http://schemas.openxmlformats.org/officeDocument/2006/customXml" ds:itemID="{87D2A1B0-FF3E-4009-940D-AED0EB70AA20}">
-  <ds:schemaRefs>
-    <ds:schemaRef ds:uri="http://schemas.microsoft.com/sharepoint/v3/contenttype/forms"/>
-  </ds:schemaRefs>
-</ds:datastoreItem>
-</file>
-
-<file path=customXml/itemProps3.xml><?xml version="1.0" encoding="utf-8"?>
-<ds:datastoreItem xmlns:ds="http://schemas.openxmlformats.org/officeDocument/2006/customXml" ds:itemID="{7B6F2769-7194-4217-93D3-3AF3A4742282}">
-  <ds:schemaRefs>
-    <ds:schemaRef ds:uri="http://schemas.microsoft.com/office/2006/metadata/properties"/>
-    <ds:schemaRef ds:uri="http://schemas.microsoft.com/office/infopath/2007/PartnerControls"/>
-    <ds:schemaRef ds:uri="http://schemas.microsoft.com/sharepoint/v3/fields"/>
-  </ds:schemaRefs>
-</ds:datastoreItem>
 </file>
</xml_diff>